<commit_message>
finish - upgradability solved
</commit_message>
<xml_diff>
--- a/ShadCn VS MUI.pptx
+++ b/ShadCn VS MUI.pptx
@@ -21,6 +21,7 @@
     <p:sldId id="268" r:id="rId15"/>
     <p:sldId id="271" r:id="rId16"/>
     <p:sldId id="273" r:id="rId17"/>
+    <p:sldId id="274" r:id="rId18"/>
   </p:sldIdLst>
   <p:sldSz cx="12192000" cy="6858000"/>
   <p:notesSz cx="6858000" cy="9144000"/>
@@ -274,7 +275,7 @@
           <a:p>
             <a:fld id="{509D112B-AECD-4401-9198-2F6DD36F4E6F}" type="datetimeFigureOut">
               <a:rPr lang="ru-RU" smtClean="0"/>
-              <a:t>29.01.2026</a:t>
+              <a:t>04.02.2026</a:t>
             </a:fld>
             <a:endParaRPr lang="ru-RU"/>
           </a:p>
@@ -472,7 +473,7 @@
           <a:p>
             <a:fld id="{509D112B-AECD-4401-9198-2F6DD36F4E6F}" type="datetimeFigureOut">
               <a:rPr lang="ru-RU" smtClean="0"/>
-              <a:t>29.01.2026</a:t>
+              <a:t>04.02.2026</a:t>
             </a:fld>
             <a:endParaRPr lang="ru-RU"/>
           </a:p>
@@ -680,7 +681,7 @@
           <a:p>
             <a:fld id="{509D112B-AECD-4401-9198-2F6DD36F4E6F}" type="datetimeFigureOut">
               <a:rPr lang="ru-RU" smtClean="0"/>
-              <a:t>29.01.2026</a:t>
+              <a:t>04.02.2026</a:t>
             </a:fld>
             <a:endParaRPr lang="ru-RU"/>
           </a:p>
@@ -878,7 +879,7 @@
           <a:p>
             <a:fld id="{509D112B-AECD-4401-9198-2F6DD36F4E6F}" type="datetimeFigureOut">
               <a:rPr lang="ru-RU" smtClean="0"/>
-              <a:t>29.01.2026</a:t>
+              <a:t>04.02.2026</a:t>
             </a:fld>
             <a:endParaRPr lang="ru-RU"/>
           </a:p>
@@ -1153,7 +1154,7 @@
           <a:p>
             <a:fld id="{509D112B-AECD-4401-9198-2F6DD36F4E6F}" type="datetimeFigureOut">
               <a:rPr lang="ru-RU" smtClean="0"/>
-              <a:t>29.01.2026</a:t>
+              <a:t>04.02.2026</a:t>
             </a:fld>
             <a:endParaRPr lang="ru-RU"/>
           </a:p>
@@ -1418,7 +1419,7 @@
           <a:p>
             <a:fld id="{509D112B-AECD-4401-9198-2F6DD36F4E6F}" type="datetimeFigureOut">
               <a:rPr lang="ru-RU" smtClean="0"/>
-              <a:t>29.01.2026</a:t>
+              <a:t>04.02.2026</a:t>
             </a:fld>
             <a:endParaRPr lang="ru-RU"/>
           </a:p>
@@ -1830,7 +1831,7 @@
           <a:p>
             <a:fld id="{509D112B-AECD-4401-9198-2F6DD36F4E6F}" type="datetimeFigureOut">
               <a:rPr lang="ru-RU" smtClean="0"/>
-              <a:t>29.01.2026</a:t>
+              <a:t>04.02.2026</a:t>
             </a:fld>
             <a:endParaRPr lang="ru-RU"/>
           </a:p>
@@ -1971,7 +1972,7 @@
           <a:p>
             <a:fld id="{509D112B-AECD-4401-9198-2F6DD36F4E6F}" type="datetimeFigureOut">
               <a:rPr lang="ru-RU" smtClean="0"/>
-              <a:t>29.01.2026</a:t>
+              <a:t>04.02.2026</a:t>
             </a:fld>
             <a:endParaRPr lang="ru-RU"/>
           </a:p>
@@ -2084,7 +2085,7 @@
           <a:p>
             <a:fld id="{509D112B-AECD-4401-9198-2F6DD36F4E6F}" type="datetimeFigureOut">
               <a:rPr lang="ru-RU" smtClean="0"/>
-              <a:t>29.01.2026</a:t>
+              <a:t>04.02.2026</a:t>
             </a:fld>
             <a:endParaRPr lang="ru-RU"/>
           </a:p>
@@ -2395,7 +2396,7 @@
           <a:p>
             <a:fld id="{509D112B-AECD-4401-9198-2F6DD36F4E6F}" type="datetimeFigureOut">
               <a:rPr lang="ru-RU" smtClean="0"/>
-              <a:t>29.01.2026</a:t>
+              <a:t>04.02.2026</a:t>
             </a:fld>
             <a:endParaRPr lang="ru-RU"/>
           </a:p>
@@ -2683,7 +2684,7 @@
           <a:p>
             <a:fld id="{509D112B-AECD-4401-9198-2F6DD36F4E6F}" type="datetimeFigureOut">
               <a:rPr lang="ru-RU" smtClean="0"/>
-              <a:t>29.01.2026</a:t>
+              <a:t>04.02.2026</a:t>
             </a:fld>
             <a:endParaRPr lang="ru-RU"/>
           </a:p>
@@ -2924,7 +2925,7 @@
           <a:p>
             <a:fld id="{509D112B-AECD-4401-9198-2F6DD36F4E6F}" type="datetimeFigureOut">
               <a:rPr lang="ru-RU" smtClean="0"/>
-              <a:t>29.01.2026</a:t>
+              <a:t>04.02.2026</a:t>
             </a:fld>
             <a:endParaRPr lang="ru-RU"/>
           </a:p>
@@ -4453,6 +4454,122 @@
 </p:sld>
 </file>
 
+<file path=ppt/slides/slide17.xml><?xml version="1.0" encoding="utf-8"?>
+<p:sld xmlns:a="http://schemas.openxmlformats.org/drawingml/2006/main" xmlns:r="http://schemas.openxmlformats.org/officeDocument/2006/relationships" xmlns:p="http://schemas.openxmlformats.org/presentationml/2006/main">
+  <p:cSld>
+    <p:spTree>
+      <p:nvGrpSpPr>
+        <p:cNvPr id="1" name=""/>
+        <p:cNvGrpSpPr/>
+        <p:nvPr/>
+      </p:nvGrpSpPr>
+      <p:grpSpPr>
+        <a:xfrm>
+          <a:off x="0" y="0"/>
+          <a:ext cx="0" cy="0"/>
+          <a:chOff x="0" y="0"/>
+          <a:chExt cx="0" cy="0"/>
+        </a:xfrm>
+      </p:grpSpPr>
+      <p:sp>
+        <p:nvSpPr>
+          <p:cNvPr id="2" name="Заголовок 1">
+            <a:extLst>
+              <a:ext uri="{FF2B5EF4-FFF2-40B4-BE49-F238E27FC236}">
+                <a16:creationId xmlns:a16="http://schemas.microsoft.com/office/drawing/2014/main" id="{7F232449-6A15-7A17-4996-654B7CB123E1}"/>
+              </a:ext>
+            </a:extLst>
+          </p:cNvPr>
+          <p:cNvSpPr>
+            <a:spLocks noGrp="1"/>
+          </p:cNvSpPr>
+          <p:nvPr>
+            <p:ph type="title"/>
+          </p:nvPr>
+        </p:nvSpPr>
+        <p:spPr/>
+        <p:txBody>
+          <a:bodyPr/>
+          <a:lstStyle/>
+          <a:p>
+            <a:r>
+              <a:rPr lang="ru-RU" dirty="0">
+                <a:solidFill>
+                  <a:srgbClr val="00B050"/>
+                </a:solidFill>
+              </a:rPr>
+              <a:t>Решение </a:t>
+            </a:r>
+            <a:r>
+              <a:rPr lang="ru-RU" dirty="0" err="1">
+                <a:solidFill>
+                  <a:srgbClr val="00B050"/>
+                </a:solidFill>
+              </a:rPr>
+              <a:t>Апгрейдабигити</a:t>
+            </a:r>
+            <a:r>
+              <a:rPr lang="ru-RU" dirty="0">
+                <a:solidFill>
+                  <a:srgbClr val="00B050"/>
+                </a:solidFill>
+              </a:rPr>
+              <a:t> </a:t>
+            </a:r>
+            <a:r>
+              <a:rPr lang="ru-RU" dirty="0"/>
+              <a:t>- </a:t>
+            </a:r>
+            <a:r>
+              <a:rPr lang="en-US" dirty="0"/>
+              <a:t>Wrapper</a:t>
+            </a:r>
+            <a:endParaRPr lang="ru-RU" dirty="0"/>
+          </a:p>
+        </p:txBody>
+      </p:sp>
+      <p:pic>
+        <p:nvPicPr>
+          <p:cNvPr id="6" name="Объект 5">
+            <a:extLst>
+              <a:ext uri="{FF2B5EF4-FFF2-40B4-BE49-F238E27FC236}">
+                <a16:creationId xmlns:a16="http://schemas.microsoft.com/office/drawing/2014/main" id="{C98E9387-EA7E-F572-154B-76BE75B3A137}"/>
+              </a:ext>
+            </a:extLst>
+          </p:cNvPr>
+          <p:cNvPicPr>
+            <a:picLocks noGrp="1" noChangeAspect="1"/>
+          </p:cNvPicPr>
+          <p:nvPr>
+            <p:ph sz="half" idx="1"/>
+          </p:nvPr>
+        </p:nvPicPr>
+        <p:blipFill>
+          <a:blip r:embed="rId2"/>
+          <a:stretch>
+            <a:fillRect/>
+          </a:stretch>
+        </p:blipFill>
+        <p:spPr>
+          <a:xfrm>
+            <a:off x="1929653" y="1373360"/>
+            <a:ext cx="8332694" cy="5367007"/>
+          </a:xfrm>
+        </p:spPr>
+      </p:pic>
+    </p:spTree>
+    <p:extLst>
+      <p:ext uri="{BB962C8B-B14F-4D97-AF65-F5344CB8AC3E}">
+        <p14:creationId xmlns:p14="http://schemas.microsoft.com/office/powerpoint/2010/main" val="2211554917"/>
+      </p:ext>
+    </p:extLst>
+  </p:cSld>
+  <p:clrMapOvr>
+    <a:masterClrMapping/>
+  </p:clrMapOvr>
+</p:sld>
+</file>
+
 <file path=ppt/slides/slide2.xml><?xml version="1.0" encoding="utf-8"?>
 <p:sld xmlns:a="http://schemas.openxmlformats.org/drawingml/2006/main" xmlns:r="http://schemas.openxmlformats.org/officeDocument/2006/relationships" xmlns:p="http://schemas.openxmlformats.org/presentationml/2006/main">
   <p:cSld>

</xml_diff>